<commit_message>
add test map and search func and draw line
add test map and search func and draw line
</commit_message>
<xml_diff>
--- a/screen/화면설계서_플래너(강준서).pptx
+++ b/screen/화면설계서_플래너(강준서).pptx
@@ -264,7 +264,7 @@
           <a:p>
             <a:fld id="{9074BD7F-5C0F-465C-A891-F87FEF347ABB}" type="datetimeFigureOut">
               <a:rPr lang="ko-KR" altLang="en-US" smtClean="0"/>
-              <a:t>2024-08-28</a:t>
+              <a:t>2024-08-29</a:t>
             </a:fld>
             <a:endParaRPr lang="ko-KR" altLang="en-US"/>
           </a:p>
@@ -462,7 +462,7 @@
           <a:p>
             <a:fld id="{9074BD7F-5C0F-465C-A891-F87FEF347ABB}" type="datetimeFigureOut">
               <a:rPr lang="ko-KR" altLang="en-US" smtClean="0"/>
-              <a:t>2024-08-28</a:t>
+              <a:t>2024-08-29</a:t>
             </a:fld>
             <a:endParaRPr lang="ko-KR" altLang="en-US"/>
           </a:p>
@@ -670,7 +670,7 @@
           <a:p>
             <a:fld id="{9074BD7F-5C0F-465C-A891-F87FEF347ABB}" type="datetimeFigureOut">
               <a:rPr lang="ko-KR" altLang="en-US" smtClean="0"/>
-              <a:t>2024-08-28</a:t>
+              <a:t>2024-08-29</a:t>
             </a:fld>
             <a:endParaRPr lang="ko-KR" altLang="en-US"/>
           </a:p>
@@ -868,7 +868,7 @@
           <a:p>
             <a:fld id="{9074BD7F-5C0F-465C-A891-F87FEF347ABB}" type="datetimeFigureOut">
               <a:rPr lang="ko-KR" altLang="en-US" smtClean="0"/>
-              <a:t>2024-08-28</a:t>
+              <a:t>2024-08-29</a:t>
             </a:fld>
             <a:endParaRPr lang="ko-KR" altLang="en-US"/>
           </a:p>
@@ -1143,7 +1143,7 @@
           <a:p>
             <a:fld id="{9074BD7F-5C0F-465C-A891-F87FEF347ABB}" type="datetimeFigureOut">
               <a:rPr lang="ko-KR" altLang="en-US" smtClean="0"/>
-              <a:t>2024-08-28</a:t>
+              <a:t>2024-08-29</a:t>
             </a:fld>
             <a:endParaRPr lang="ko-KR" altLang="en-US"/>
           </a:p>
@@ -1408,7 +1408,7 @@
           <a:p>
             <a:fld id="{9074BD7F-5C0F-465C-A891-F87FEF347ABB}" type="datetimeFigureOut">
               <a:rPr lang="ko-KR" altLang="en-US" smtClean="0"/>
-              <a:t>2024-08-28</a:t>
+              <a:t>2024-08-29</a:t>
             </a:fld>
             <a:endParaRPr lang="ko-KR" altLang="en-US"/>
           </a:p>
@@ -1820,7 +1820,7 @@
           <a:p>
             <a:fld id="{9074BD7F-5C0F-465C-A891-F87FEF347ABB}" type="datetimeFigureOut">
               <a:rPr lang="ko-KR" altLang="en-US" smtClean="0"/>
-              <a:t>2024-08-28</a:t>
+              <a:t>2024-08-29</a:t>
             </a:fld>
             <a:endParaRPr lang="ko-KR" altLang="en-US"/>
           </a:p>
@@ -1961,7 +1961,7 @@
           <a:p>
             <a:fld id="{9074BD7F-5C0F-465C-A891-F87FEF347ABB}" type="datetimeFigureOut">
               <a:rPr lang="ko-KR" altLang="en-US" smtClean="0"/>
-              <a:t>2024-08-28</a:t>
+              <a:t>2024-08-29</a:t>
             </a:fld>
             <a:endParaRPr lang="ko-KR" altLang="en-US"/>
           </a:p>
@@ -2074,7 +2074,7 @@
           <a:p>
             <a:fld id="{9074BD7F-5C0F-465C-A891-F87FEF347ABB}" type="datetimeFigureOut">
               <a:rPr lang="ko-KR" altLang="en-US" smtClean="0"/>
-              <a:t>2024-08-28</a:t>
+              <a:t>2024-08-29</a:t>
             </a:fld>
             <a:endParaRPr lang="ko-KR" altLang="en-US"/>
           </a:p>
@@ -2385,7 +2385,7 @@
           <a:p>
             <a:fld id="{9074BD7F-5C0F-465C-A891-F87FEF347ABB}" type="datetimeFigureOut">
               <a:rPr lang="ko-KR" altLang="en-US" smtClean="0"/>
-              <a:t>2024-08-28</a:t>
+              <a:t>2024-08-29</a:t>
             </a:fld>
             <a:endParaRPr lang="ko-KR" altLang="en-US"/>
           </a:p>
@@ -2673,7 +2673,7 @@
           <a:p>
             <a:fld id="{9074BD7F-5C0F-465C-A891-F87FEF347ABB}" type="datetimeFigureOut">
               <a:rPr lang="ko-KR" altLang="en-US" smtClean="0"/>
-              <a:t>2024-08-28</a:t>
+              <a:t>2024-08-29</a:t>
             </a:fld>
             <a:endParaRPr lang="ko-KR" altLang="en-US"/>
           </a:p>
@@ -2914,7 +2914,7 @@
           <a:p>
             <a:fld id="{9074BD7F-5C0F-465C-A891-F87FEF347ABB}" type="datetimeFigureOut">
               <a:rPr lang="ko-KR" altLang="en-US" smtClean="0"/>
-              <a:t>2024-08-28</a:t>
+              <a:t>2024-08-29</a:t>
             </a:fld>
             <a:endParaRPr lang="ko-KR" altLang="en-US"/>
           </a:p>
@@ -3572,7 +3572,7 @@
             </a:r>
             <a:r>
               <a:rPr lang="en-US" altLang="ko-KR" sz="3200" dirty="0"/>
-              <a:t>(P000001)</a:t>
+              <a:t>(P01)</a:t>
             </a:r>
             <a:endParaRPr lang="ko-KR" altLang="en-US" sz="3200" dirty="0"/>
           </a:p>
@@ -4653,8 +4653,8 @@
         </p:blipFill>
         <p:spPr>
           <a:xfrm>
-            <a:off x="2685572" y="2767492"/>
-            <a:ext cx="2880341" cy="922605"/>
+            <a:off x="2699506" y="2767492"/>
+            <a:ext cx="2866408" cy="922605"/>
           </a:xfrm>
           <a:prstGeom prst="rect">
             <a:avLst/>
@@ -4923,7 +4923,7 @@
             </a:r>
             <a:r>
               <a:rPr lang="en-US" altLang="ko-KR" sz="3200" dirty="0"/>
-              <a:t>(P000002)</a:t>
+              <a:t>(P02)</a:t>
             </a:r>
             <a:endParaRPr lang="ko-KR" altLang="en-US" sz="3200" dirty="0"/>
           </a:p>
@@ -6914,7 +6914,7 @@
             </a:r>
             <a:r>
               <a:rPr lang="en-US" altLang="ko-KR" sz="3200" dirty="0"/>
-              <a:t>(P000003)</a:t>
+              <a:t>(P03)</a:t>
             </a:r>
             <a:endParaRPr lang="ko-KR" altLang="en-US" sz="3200" dirty="0"/>
           </a:p>
@@ -9213,7 +9213,7 @@
             </a:r>
             <a:r>
               <a:rPr lang="en-US" altLang="ko-KR" sz="3200" dirty="0"/>
-              <a:t>(P000004)</a:t>
+              <a:t>(P04)</a:t>
             </a:r>
             <a:endParaRPr lang="ko-KR" altLang="en-US" sz="3200" dirty="0"/>
           </a:p>
@@ -12174,7 +12174,7 @@
             </a:r>
             <a:r>
               <a:rPr lang="en-US" altLang="ko-KR" sz="3200" dirty="0"/>
-              <a:t>(P000005)</a:t>
+              <a:t>(P05)</a:t>
             </a:r>
             <a:endParaRPr lang="ko-KR" altLang="en-US" sz="3200" dirty="0"/>
           </a:p>
@@ -14389,42 +14389,6 @@
           </a:p>
         </p:txBody>
       </p:sp>
-      <p:pic>
-        <p:nvPicPr>
-          <p:cNvPr id="78" name="그림 77">
-            <a:extLst>
-              <a:ext uri="{FF2B5EF4-FFF2-40B4-BE49-F238E27FC236}">
-                <a16:creationId xmlns:a16="http://schemas.microsoft.com/office/drawing/2014/main" id="{D495D043-7F80-4009-AB72-6372C94D793F}"/>
-              </a:ext>
-            </a:extLst>
-          </p:cNvPr>
-          <p:cNvPicPr>
-            <a:picLocks noChangeAspect="1"/>
-          </p:cNvPicPr>
-          <p:nvPr/>
-        </p:nvPicPr>
-        <p:blipFill>
-          <a:blip r:embed="rId3">
-            <a:extLst>
-              <a:ext uri="{28A0092B-C50C-407E-A947-70E740481C1C}">
-                <a14:useLocalDpi xmlns:a14="http://schemas.microsoft.com/office/drawing/2010/main" val="0"/>
-              </a:ext>
-            </a:extLst>
-          </a:blip>
-          <a:stretch>
-            <a:fillRect/>
-          </a:stretch>
-        </p:blipFill>
-        <p:spPr>
-          <a:xfrm>
-            <a:off x="4882557" y="5732760"/>
-            <a:ext cx="125502" cy="106909"/>
-          </a:xfrm>
-          <a:prstGeom prst="rect">
-            <a:avLst/>
-          </a:prstGeom>
-        </p:spPr>
-      </p:pic>
       <p:sp>
         <p:nvSpPr>
           <p:cNvPr id="80" name="TextBox 79">

</xml_diff>